<commit_message>
Update to Discovery TPAC Pres
add actions; add pdf version
</commit_message>
<xml_diff>
--- a/PRESENTATIONS/2019-09_WoT-Discovery.pptx
+++ b/PRESENTATIONS/2019-09_WoT-Discovery.pptx
@@ -14,17 +14,18 @@
     <p:sldMasterId id="2147483720" r:id="rId23"/>
   </p:sldMasterIdLst>
   <p:notesMasterIdLst>
-    <p:notesMasterId r:id="rId27"/>
+    <p:notesMasterId r:id="rId28"/>
   </p:notesMasterIdLst>
   <p:sldIdLst>
     <p:sldId id="1449" r:id="rId24"/>
     <p:sldId id="1450" r:id="rId25"/>
     <p:sldId id="1452" r:id="rId26"/>
+    <p:sldId id="1453" r:id="rId27"/>
   </p:sldIdLst>
   <p:sldSz cx="12198350" cy="6858000"/>
   <p:notesSz cx="6858000" cy="9144000"/>
   <p:custDataLst>
-    <p:tags r:id="rId28"/>
+    <p:tags r:id="rId29"/>
   </p:custDataLst>
   <p:defaultTextStyle>
     <a:defPPr>
@@ -25020,6 +25021,178 @@
     <p:extLst>
       <p:ext uri="{BB962C8B-B14F-4D97-AF65-F5344CB8AC3E}">
         <p14:creationId xmlns:p14="http://schemas.microsoft.com/office/powerpoint/2010/main" val="4191038634"/>
+      </p:ext>
+    </p:extLst>
+  </p:cSld>
+  <p:clrMapOvr>
+    <a:masterClrMapping/>
+  </p:clrMapOvr>
+</p:sld>
+</file>
+
+<file path=ppt/slides/slide4.xml><?xml version="1.0" encoding="utf-8"?>
+<p:sld xmlns:a="http://schemas.openxmlformats.org/drawingml/2006/main" xmlns:r="http://schemas.openxmlformats.org/officeDocument/2006/relationships" xmlns:p="http://schemas.openxmlformats.org/presentationml/2006/main">
+  <p:cSld>
+    <p:spTree>
+      <p:nvGrpSpPr>
+        <p:cNvPr id="1" name=""/>
+        <p:cNvGrpSpPr/>
+        <p:nvPr/>
+      </p:nvGrpSpPr>
+      <p:grpSpPr>
+        <a:xfrm>
+          <a:off x="0" y="0"/>
+          <a:ext cx="0" cy="0"/>
+          <a:chOff x="0" y="0"/>
+          <a:chExt cx="0" cy="0"/>
+        </a:xfrm>
+      </p:grpSpPr>
+      <p:sp>
+        <p:nvSpPr>
+          <p:cNvPr id="2" name="Title 1">
+            <a:extLst>
+              <a:ext uri="{FF2B5EF4-FFF2-40B4-BE49-F238E27FC236}">
+                <a16:creationId xmlns:a16="http://schemas.microsoft.com/office/drawing/2014/main" id="{2A6E45D3-AEF9-4DE7-B134-40BFE09B4134}"/>
+              </a:ext>
+            </a:extLst>
+          </p:cNvPr>
+          <p:cNvSpPr>
+            <a:spLocks noGrp="1"/>
+          </p:cNvSpPr>
+          <p:nvPr>
+            <p:ph type="title"/>
+          </p:nvPr>
+        </p:nvSpPr>
+        <p:spPr/>
+        <p:txBody>
+          <a:bodyPr/>
+          <a:lstStyle/>
+          <a:p>
+            <a:r>
+              <a:rPr lang="en-US" dirty="0"/>
+              <a:t>Actions</a:t>
+            </a:r>
+          </a:p>
+        </p:txBody>
+      </p:sp>
+      <p:sp>
+        <p:nvSpPr>
+          <p:cNvPr id="3" name="Content Placeholder 2">
+            <a:extLst>
+              <a:ext uri="{FF2B5EF4-FFF2-40B4-BE49-F238E27FC236}">
+                <a16:creationId xmlns:a16="http://schemas.microsoft.com/office/drawing/2014/main" id="{ED0B9875-FCE3-40DD-8EA0-E92EB1146B37}"/>
+              </a:ext>
+            </a:extLst>
+          </p:cNvPr>
+          <p:cNvSpPr>
+            <a:spLocks noGrp="1"/>
+          </p:cNvSpPr>
+          <p:nvPr>
+            <p:ph idx="1"/>
+          </p:nvPr>
+        </p:nvSpPr>
+        <p:spPr/>
+        <p:txBody>
+          <a:bodyPr/>
+          <a:lstStyle/>
+          <a:p>
+            <a:r>
+              <a:rPr lang="en-US" dirty="0"/>
+              <a:t>Create Discovery Repo: </a:t>
+            </a:r>
+          </a:p>
+          <a:p>
+            <a:pPr lvl="1"/>
+            <a:r>
+              <a:rPr lang="en-US" dirty="0"/>
+              <a:t>wot-discovery</a:t>
+            </a:r>
+          </a:p>
+          <a:p>
+            <a:r>
+              <a:rPr lang="en-US" dirty="0"/>
+              <a:t>Create Discovery TF under WoT WG (new charter)</a:t>
+            </a:r>
+          </a:p>
+          <a:p>
+            <a:r>
+              <a:rPr lang="en-US" dirty="0"/>
+              <a:t>Develop formal Use Cases and Requirements</a:t>
+            </a:r>
+          </a:p>
+          <a:p>
+            <a:r>
+              <a:rPr lang="en-US" dirty="0"/>
+              <a:t>Develop Design Documents</a:t>
+            </a:r>
+          </a:p>
+          <a:p>
+            <a:r>
+              <a:rPr lang="en-US" dirty="0"/>
+              <a:t>Get Feedback </a:t>
+            </a:r>
+            <a:r>
+              <a:rPr lang="en-US"/>
+              <a:t>from Privacy IG</a:t>
+            </a:r>
+            <a:endParaRPr lang="en-US" dirty="0"/>
+          </a:p>
+          <a:p>
+            <a:r>
+              <a:rPr lang="en-US" dirty="0"/>
+              <a:t>Aim to develop prototypes by IETF Hackathon</a:t>
+            </a:r>
+          </a:p>
+          <a:p>
+            <a:r>
+              <a:rPr lang="en-US" dirty="0"/>
+              <a:t>Aim to present at T2TRG/WoT workshop on Nov 15</a:t>
+            </a:r>
+          </a:p>
+          <a:p>
+            <a:r>
+              <a:rPr lang="en-US" dirty="0"/>
+              <a:t>Develop Draft Specification</a:t>
+            </a:r>
+          </a:p>
+          <a:p>
+            <a:endParaRPr lang="en-US" dirty="0"/>
+          </a:p>
+        </p:txBody>
+      </p:sp>
+      <p:sp>
+        <p:nvSpPr>
+          <p:cNvPr id="4" name="Slide Number Placeholder 3">
+            <a:extLst>
+              <a:ext uri="{FF2B5EF4-FFF2-40B4-BE49-F238E27FC236}">
+                <a16:creationId xmlns:a16="http://schemas.microsoft.com/office/drawing/2014/main" id="{F140C901-2A6E-4717-9114-2C1DD968637F}"/>
+              </a:ext>
+            </a:extLst>
+          </p:cNvPr>
+          <p:cNvSpPr>
+            <a:spLocks noGrp="1"/>
+          </p:cNvSpPr>
+          <p:nvPr>
+            <p:ph type="sldNum" sz="quarter" idx="12"/>
+          </p:nvPr>
+        </p:nvSpPr>
+        <p:spPr/>
+        <p:txBody>
+          <a:bodyPr/>
+          <a:lstStyle/>
+          <a:p>
+            <a:fld id="{30564719-00ED-40AD-AF49-5F6D6B9333CD}" type="slidenum">
+              <a:rPr lang="en-US" smtClean="0"/>
+              <a:t>4</a:t>
+            </a:fld>
+            <a:endParaRPr lang="en-US"/>
+          </a:p>
+        </p:txBody>
+      </p:sp>
+    </p:spTree>
+    <p:extLst>
+      <p:ext uri="{BB962C8B-B14F-4D97-AF65-F5344CB8AC3E}">
+        <p14:creationId xmlns:p14="http://schemas.microsoft.com/office/powerpoint/2010/main" val="2712274654"/>
       </p:ext>
     </p:extLst>
   </p:cSld>

</xml_diff>